<commit_message>
Changes to testing slides
</commit_message>
<xml_diff>
--- a/Spotify API Testing.pptx
+++ b/Spotify API Testing.pptx
@@ -4289,13 +4289,22 @@
           <a:bodyPr/>
           <a:lstStyle/>
           <a:p>
+            <a:pPr marL="0" indent="0">
+              <a:buNone/>
+            </a:pPr>
+            <a:r>
+              <a:rPr lang="en-GB" u="sng" dirty="0"/>
+              <a:t>Services we tested:</a:t>
+            </a:r>
+          </a:p>
+          <a:p>
             <a:pPr>
               <a:buFont typeface="Arial" panose="020B0604020202020204" pitchFamily="34" charset="0"/>
               <a:buChar char="•"/>
             </a:pPr>
             <a:r>
               <a:rPr lang="en-GB" dirty="0"/>
-              <a:t>Follow Artist/User</a:t>
+              <a:t>Follow Artist/User Service</a:t>
             </a:r>
           </a:p>
           <a:p>
@@ -4304,10 +4313,9 @@
               <a:buChar char="•"/>
             </a:pPr>
             <a:r>
-              <a:rPr lang="en-GB" dirty="0" err="1"/>
-              <a:t>GetAlbums</a:t>
-            </a:r>
-            <a:endParaRPr lang="en-GB" dirty="0"/>
+              <a:rPr lang="en-GB" dirty="0"/>
+              <a:t>Get Albums Service</a:t>
+            </a:r>
           </a:p>
           <a:p>
             <a:pPr>
@@ -4315,10 +4323,9 @@
               <a:buChar char="•"/>
             </a:pPr>
             <a:r>
-              <a:rPr lang="en-GB" dirty="0" err="1"/>
-              <a:t>GetArtistUser</a:t>
-            </a:r>
-            <a:endParaRPr lang="en-GB" dirty="0"/>
+              <a:rPr lang="en-GB" dirty="0"/>
+              <a:t>Get Artist/User Service</a:t>
+            </a:r>
           </a:p>
           <a:p>
             <a:pPr>
@@ -4326,10 +4333,9 @@
               <a:buChar char="•"/>
             </a:pPr>
             <a:r>
-              <a:rPr lang="en-GB" dirty="0" err="1"/>
-              <a:t>GetFollowingArtist</a:t>
-            </a:r>
-            <a:endParaRPr lang="en-GB" dirty="0"/>
+              <a:rPr lang="en-GB" dirty="0"/>
+              <a:t>Get Following Artist Service</a:t>
+            </a:r>
           </a:p>
           <a:p>
             <a:pPr>
@@ -4337,8 +4343,12 @@
               <a:buChar char="•"/>
             </a:pPr>
             <a:r>
-              <a:rPr lang="en-GB" dirty="0" err="1"/>
-              <a:t>UnfollowArtistUser</a:t>
+              <a:rPr lang="en-GB" dirty="0"/>
+              <a:t>Unfollow Artist/</a:t>
+            </a:r>
+            <a:r>
+              <a:rPr lang="en-GB"/>
+              <a:t>User Service</a:t>
             </a:r>
             <a:endParaRPr lang="en-GB" dirty="0"/>
           </a:p>
@@ -4618,7 +4628,7 @@
               <a:t>We tested for</a:t>
             </a:r>
             <a:r>
-              <a:rPr lang="en-GB" dirty="0"/>
+              <a:rPr lang="en-GB" u="sng" dirty="0"/>
               <a:t>:</a:t>
             </a:r>
           </a:p>

</xml_diff>

<commit_message>
fix typos on pp
</commit_message>
<xml_diff>
--- a/Spotify API Testing.pptx
+++ b/Spotify API Testing.pptx
@@ -366,7 +366,7 @@
           <a:p>
             <a:fld id="{9184DA70-C731-4C70-880D-CCD4705E623C}" type="datetime1">
               <a:rPr lang="en-US" smtClean="0"/>
-              <a:t>6/10/2021</a:t>
+              <a:t>6/11/2021</a:t>
             </a:fld>
             <a:endParaRPr lang="en-US" dirty="0"/>
           </a:p>
@@ -554,7 +554,7 @@
           <a:p>
             <a:fld id="{4BE1D723-8F53-4F53-90B0-1982A396982E}" type="datetime1">
               <a:rPr lang="en-US" smtClean="0"/>
-              <a:t>6/10/2021</a:t>
+              <a:t>6/11/2021</a:t>
             </a:fld>
             <a:endParaRPr lang="en-US" dirty="0"/>
           </a:p>
@@ -927,7 +927,7 @@
           <a:p>
             <a:fld id="{97669AF7-7BEB-44E4-9852-375E34362B5B}" type="datetime1">
               <a:rPr lang="en-US" smtClean="0"/>
-              <a:t>6/10/2021</a:t>
+              <a:t>6/11/2021</a:t>
             </a:fld>
             <a:endParaRPr lang="en-US" dirty="0"/>
           </a:p>
@@ -1182,7 +1182,7 @@
           <a:p>
             <a:fld id="{BAAAC38D-0552-4C82-B593-E6124DFADBE2}" type="datetime1">
               <a:rPr lang="en-US" smtClean="0"/>
-              <a:t>6/10/2021</a:t>
+              <a:t>6/11/2021</a:t>
             </a:fld>
             <a:endParaRPr lang="en-US" dirty="0"/>
           </a:p>
@@ -1579,7 +1579,7 @@
           <a:p>
             <a:fld id="{D9DF0F1C-5577-4ACB-BB62-DF8F3C494C7E}" type="datetime1">
               <a:rPr lang="en-US" smtClean="0"/>
-              <a:t>6/10/2021</a:t>
+              <a:t>6/11/2021</a:t>
             </a:fld>
             <a:endParaRPr lang="en-US" dirty="0"/>
           </a:p>
@@ -1715,7 +1715,7 @@
           <a:p>
             <a:fld id="{1775B394-D9F9-4F0C-B15D-605F45CB9E9F}" type="datetime1">
               <a:rPr lang="en-US" smtClean="0"/>
-              <a:t>6/10/2021</a:t>
+              <a:t>6/11/2021</a:t>
             </a:fld>
             <a:endParaRPr lang="en-US" dirty="0"/>
           </a:p>
@@ -1872,7 +1872,7 @@
           <a:p>
             <a:fld id="{39667345-2558-425A-8533-9BFDBCE15005}" type="datetime1">
               <a:rPr lang="en-US" smtClean="0"/>
-              <a:t>6/10/2021</a:t>
+              <a:t>6/11/2021</a:t>
             </a:fld>
             <a:endParaRPr lang="en-US" dirty="0"/>
           </a:p>
@@ -2201,7 +2201,7 @@
           <a:p>
             <a:fld id="{92BEA474-078D-4E9B-9B14-09A87B19DC46}" type="datetime1">
               <a:rPr lang="en-US" smtClean="0"/>
-              <a:t>6/10/2021</a:t>
+              <a:t>6/11/2021</a:t>
             </a:fld>
             <a:endParaRPr lang="en-US" dirty="0"/>
           </a:p>
@@ -2551,7 +2551,7 @@
           <a:p>
             <a:fld id="{4907D986-8816-4272-A432-0437A28A9828}" type="datetime1">
               <a:rPr lang="en-US" smtClean="0"/>
-              <a:t>6/10/2021</a:t>
+              <a:t>6/11/2021</a:t>
             </a:fld>
             <a:endParaRPr lang="en-US" dirty="0"/>
           </a:p>
@@ -2812,7 +2812,7 @@
           <a:p>
             <a:fld id="{62D6E202-B606-4609-B914-27C9371A1F6D}" type="datetime1">
               <a:rPr lang="en-US" smtClean="0"/>
-              <a:t>6/10/2021</a:t>
+              <a:t>6/11/2021</a:t>
             </a:fld>
             <a:endParaRPr lang="en-US" dirty="0"/>
           </a:p>
@@ -3870,7 +3870,7 @@
             </a:pPr>
             <a:r>
               <a:rPr lang="en-GB" dirty="0"/>
-              <a:t>We has problems with requests that did not return a JSON string, we resolved this by using a try catch block</a:t>
+              <a:t>We had problems with requests that did not return a JSON string, we resolved this by using a try catch block</a:t>
             </a:r>
           </a:p>
           <a:p>
@@ -4304,7 +4304,7 @@
             </a:pPr>
             <a:r>
               <a:rPr lang="en-GB" dirty="0"/>
-              <a:t>Follow Artist/User Service</a:t>
+              <a:t>Follow Artist/User</a:t>
             </a:r>
           </a:p>
           <a:p>
@@ -4314,7 +4314,7 @@
             </a:pPr>
             <a:r>
               <a:rPr lang="en-GB" dirty="0"/>
-              <a:t>Get Albums Service</a:t>
+              <a:t>Get Albums</a:t>
             </a:r>
           </a:p>
           <a:p>
@@ -4324,7 +4324,7 @@
             </a:pPr>
             <a:r>
               <a:rPr lang="en-GB" dirty="0"/>
-              <a:t>Get Artist/User Service</a:t>
+              <a:t>Get Artist/User</a:t>
             </a:r>
           </a:p>
           <a:p>
@@ -4334,7 +4334,7 @@
             </a:pPr>
             <a:r>
               <a:rPr lang="en-GB" dirty="0"/>
-              <a:t>Get Following Artist Service</a:t>
+              <a:t>Get Following Artists</a:t>
             </a:r>
           </a:p>
           <a:p>
@@ -4344,13 +4344,8 @@
             </a:pPr>
             <a:r>
               <a:rPr lang="en-GB" dirty="0"/>
-              <a:t>Unfollow Artist/</a:t>
-            </a:r>
-            <a:r>
-              <a:rPr lang="en-GB"/>
-              <a:t>User Service</a:t>
-            </a:r>
-            <a:endParaRPr lang="en-GB" dirty="0"/>
+              <a:t>Unfollow Artist/User</a:t>
+            </a:r>
           </a:p>
         </p:txBody>
       </p:sp>
@@ -4875,7 +4870,7 @@
         </p:blipFill>
         <p:spPr bwMode="auto">
           <a:xfrm>
-            <a:off x="5942386" y="1947681"/>
+            <a:off x="4338872" y="1947681"/>
             <a:ext cx="4759792" cy="4378064"/>
           </a:xfrm>
           <a:prstGeom prst="rect">
@@ -4920,7 +4915,7 @@
         </p:blipFill>
         <p:spPr bwMode="auto">
           <a:xfrm>
-            <a:off x="2219230" y="3053888"/>
+            <a:off x="1703346" y="2731159"/>
             <a:ext cx="1866900" cy="2389482"/>
           </a:xfrm>
           <a:prstGeom prst="rect">
@@ -5907,24 +5902,6 @@
 </file>
 
 <file path=customXml/item1.xml><?xml version="1.0" encoding="utf-8"?>
-<?mso-contentType ?>
-<FormTemplates xmlns="http://schemas.microsoft.com/sharepoint/v3/contenttype/forms">
-  <Display>DocumentLibraryForm</Display>
-  <Edit>DocumentLibraryForm</Edit>
-  <New>DocumentLibraryForm</New>
-</FormTemplates>
-</file>
-
-<file path=customXml/item2.xml><?xml version="1.0" encoding="utf-8"?>
-<p:properties xmlns:p="http://schemas.microsoft.com/office/2006/metadata/properties" xmlns:xsi="http://www.w3.org/2001/XMLSchema-instance" xmlns:pc="http://schemas.microsoft.com/office/infopath/2007/PartnerControls">
-  <documentManagement>
-    <Status xmlns="71af3243-3dd4-4a8d-8c0d-dd76da1f02a5">Not started</Status>
-    <MediaServiceKeyPoints xmlns="71af3243-3dd4-4a8d-8c0d-dd76da1f02a5" xsi:nil="true"/>
-  </documentManagement>
-</p:properties>
-</file>
-
-<file path=customXml/item3.xml><?xml version="1.0" encoding="utf-8"?>
 <ct:contentTypeSchema xmlns:ct="http://schemas.microsoft.com/office/2006/metadata/contentType" xmlns:ma="http://schemas.microsoft.com/office/2006/metadata/properties/metaAttributes" ct:_="" ma:_="" ma:contentTypeName="Document" ma:contentTypeID="0x01010079F111ED35F8CC479449609E8A0923A6" ma:contentTypeVersion="12" ma:contentTypeDescription="Create a new document." ma:contentTypeScope="" ma:versionID="a410dd7f93c95333ffa1b60ed6adedd1">
   <xsd:schema xmlns:xsd="http://www.w3.org/2001/XMLSchema" xmlns:xs="http://www.w3.org/2001/XMLSchema" xmlns:p="http://schemas.microsoft.com/office/2006/metadata/properties" xmlns:ns2="71af3243-3dd4-4a8d-8c0d-dd76da1f02a5" xmlns:ns3="16c05727-aa75-4e4a-9b5f-8a80a1165891" targetNamespace="http://schemas.microsoft.com/office/2006/metadata/properties" ma:root="true" ma:fieldsID="a936d9baba76aa3866493feff160faab" ns2:_="" ns3:_="">
     <xsd:import namespace="71af3243-3dd4-4a8d-8c0d-dd76da1f02a5"/>
@@ -6145,25 +6122,25 @@
 </ct:contentTypeSchema>
 </file>
 
-<file path=customXml/itemProps1.xml><?xml version="1.0" encoding="utf-8"?>
-<ds:datastoreItem xmlns:ds="http://schemas.openxmlformats.org/officeDocument/2006/customXml" ds:itemID="{AA3F7EDC-E5B4-4BBC-9D2A-CBE6D46C37AD}">
-  <ds:schemaRefs>
-    <ds:schemaRef ds:uri="http://schemas.microsoft.com/sharepoint/v3/contenttype/forms"/>
-  </ds:schemaRefs>
-</ds:datastoreItem>
+<file path=customXml/item2.xml><?xml version="1.0" encoding="utf-8"?>
+<p:properties xmlns:p="http://schemas.microsoft.com/office/2006/metadata/properties" xmlns:xsi="http://www.w3.org/2001/XMLSchema-instance" xmlns:pc="http://schemas.microsoft.com/office/infopath/2007/PartnerControls">
+  <documentManagement>
+    <Status xmlns="71af3243-3dd4-4a8d-8c0d-dd76da1f02a5">Not started</Status>
+    <MediaServiceKeyPoints xmlns="71af3243-3dd4-4a8d-8c0d-dd76da1f02a5" xsi:nil="true"/>
+  </documentManagement>
+</p:properties>
 </file>
 
-<file path=customXml/itemProps2.xml><?xml version="1.0" encoding="utf-8"?>
-<ds:datastoreItem xmlns:ds="http://schemas.openxmlformats.org/officeDocument/2006/customXml" ds:itemID="{A03EEFF0-FB57-4CB4-8BFC-DF397689E2ED}">
-  <ds:schemaRefs>
-    <ds:schemaRef ds:uri="http://schemas.microsoft.com/office/2006/metadata/properties"/>
-    <ds:schemaRef ds:uri="http://schemas.microsoft.com/office/infopath/2007/PartnerControls"/>
-    <ds:schemaRef ds:uri="71af3243-3dd4-4a8d-8c0d-dd76da1f02a5"/>
-  </ds:schemaRefs>
-</ds:datastoreItem>
+<file path=customXml/item3.xml><?xml version="1.0" encoding="utf-8"?>
+<?mso-contentType ?>
+<FormTemplates xmlns="http://schemas.microsoft.com/sharepoint/v3/contenttype/forms">
+  <Display>DocumentLibraryForm</Display>
+  <Edit>DocumentLibraryForm</Edit>
+  <New>DocumentLibraryForm</New>
+</FormTemplates>
 </file>
 
-<file path=customXml/itemProps3.xml><?xml version="1.0" encoding="utf-8"?>
+<file path=customXml/itemProps1.xml><?xml version="1.0" encoding="utf-8"?>
 <ds:datastoreItem xmlns:ds="http://schemas.openxmlformats.org/officeDocument/2006/customXml" ds:itemID="{93932EF5-314F-409E-8020-FEE5FA0795B9}">
   <ds:schemaRefs>
     <ds:schemaRef ds:uri="http://schemas.microsoft.com/office/2006/metadata/contentType"/>
@@ -6180,4 +6157,22 @@
     <ds:schemaRef ds:uri="http://schemas.microsoft.com/internal/obd"/>
   </ds:schemaRefs>
 </ds:datastoreItem>
+</file>
+
+<file path=customXml/itemProps2.xml><?xml version="1.0" encoding="utf-8"?>
+<ds:datastoreItem xmlns:ds="http://schemas.openxmlformats.org/officeDocument/2006/customXml" ds:itemID="{A03EEFF0-FB57-4CB4-8BFC-DF397689E2ED}">
+  <ds:schemaRefs>
+    <ds:schemaRef ds:uri="http://schemas.microsoft.com/office/2006/metadata/properties"/>
+    <ds:schemaRef ds:uri="http://schemas.microsoft.com/office/infopath/2007/PartnerControls"/>
+    <ds:schemaRef ds:uri="71af3243-3dd4-4a8d-8c0d-dd76da1f02a5"/>
+  </ds:schemaRefs>
+</ds:datastoreItem>
+</file>
+
+<file path=customXml/itemProps3.xml><?xml version="1.0" encoding="utf-8"?>
+<ds:datastoreItem xmlns:ds="http://schemas.openxmlformats.org/officeDocument/2006/customXml" ds:itemID="{AA3F7EDC-E5B4-4BBC-9D2A-CBE6D46C37AD}">
+  <ds:schemaRefs>
+    <ds:schemaRef ds:uri="http://schemas.microsoft.com/sharepoint/v3/contenttype/forms"/>
+  </ds:schemaRefs>
+</ds:datastoreItem>
 </file>
</xml_diff>